<commit_message>
update readme.md with model links
</commit_message>
<xml_diff>
--- a/project_docs/137_PaperPresentation.pptx
+++ b/project_docs/137_PaperPresentation.pptx
@@ -112,6 +112,11 @@
       </a:defRPr>
     </a:lvl9pPr>
   </p:defaultTextStyle>
+  <p:extLst>
+    <p:ext uri="{EFAFB233-063F-42B5-8137-9DF3F51BA10A}">
+      <p15:sldGuideLst xmlns:p15="http://schemas.microsoft.com/office/powerpoint/2012/main"/>
+    </p:ext>
+  </p:extLst>
 </p:presentation>
 </file>
 
@@ -285,7 +290,7 @@
             <a:fld id="{87DE6118-2437-4B30-8E3C-4D2BE6020583}" type="datetimeFigureOut">
               <a:rPr lang="en-US" dirty="0"/>
               <a:pPr/>
-              <a:t>5/6/22</a:t>
+              <a:t>5/7/22</a:t>
             </a:fld>
             <a:endParaRPr lang="en-US" dirty="0"/>
           </a:p>
@@ -611,7 +616,7 @@
           <a:p>
             <a:fld id="{87DE6118-2437-4B30-8E3C-4D2BE6020583}" type="datetimeFigureOut">
               <a:rPr lang="en-US" dirty="0"/>
-              <a:t>5/6/22</a:t>
+              <a:t>5/7/22</a:t>
             </a:fld>
             <a:endParaRPr lang="en-US" dirty="0"/>
           </a:p>
@@ -786,7 +791,7 @@
           <a:p>
             <a:fld id="{87DE6118-2437-4B30-8E3C-4D2BE6020583}" type="datetimeFigureOut">
               <a:rPr lang="en-US" dirty="0"/>
-              <a:t>5/6/22</a:t>
+              <a:t>5/7/22</a:t>
             </a:fld>
             <a:endParaRPr lang="en-US" dirty="0"/>
           </a:p>
@@ -951,7 +956,7 @@
           <a:p>
             <a:fld id="{87DE6118-2437-4B30-8E3C-4D2BE6020583}" type="datetimeFigureOut">
               <a:rPr lang="en-US" dirty="0"/>
-              <a:t>5/6/22</a:t>
+              <a:t>5/7/22</a:t>
             </a:fld>
             <a:endParaRPr lang="en-US" dirty="0"/>
           </a:p>
@@ -1224,7 +1229,7 @@
             <a:fld id="{87DE6118-2437-4B30-8E3C-4D2BE6020583}" type="datetimeFigureOut">
               <a:rPr lang="en-US" dirty="0"/>
               <a:pPr/>
-              <a:t>5/6/22</a:t>
+              <a:t>5/7/22</a:t>
             </a:fld>
             <a:endParaRPr lang="en-US" dirty="0"/>
           </a:p>
@@ -1614,7 +1619,7 @@
           <a:p>
             <a:fld id="{87DE6118-2437-4B30-8E3C-4D2BE6020583}" type="datetimeFigureOut">
               <a:rPr lang="en-US" dirty="0"/>
-              <a:t>5/6/22</a:t>
+              <a:t>5/7/22</a:t>
             </a:fld>
             <a:endParaRPr lang="en-US" dirty="0"/>
           </a:p>
@@ -2086,7 +2091,7 @@
           <a:p>
             <a:fld id="{87DE6118-2437-4B30-8E3C-4D2BE6020583}" type="datetimeFigureOut">
               <a:rPr lang="en-US" dirty="0"/>
-              <a:t>5/6/22</a:t>
+              <a:t>5/7/22</a:t>
             </a:fld>
             <a:endParaRPr lang="en-US" dirty="0"/>
           </a:p>
@@ -2199,7 +2204,7 @@
           <a:p>
             <a:fld id="{87DE6118-2437-4B30-8E3C-4D2BE6020583}" type="datetimeFigureOut">
               <a:rPr lang="en-US" dirty="0"/>
-              <a:t>5/6/22</a:t>
+              <a:t>5/7/22</a:t>
             </a:fld>
             <a:endParaRPr lang="en-US" dirty="0"/>
           </a:p>
@@ -2289,7 +2294,7 @@
           <a:p>
             <a:fld id="{87DE6118-2437-4B30-8E3C-4D2BE6020583}" type="datetimeFigureOut">
               <a:rPr lang="en-US" dirty="0"/>
-              <a:t>5/6/22</a:t>
+              <a:t>5/7/22</a:t>
             </a:fld>
             <a:endParaRPr lang="en-US" dirty="0"/>
           </a:p>
@@ -2631,7 +2636,7 @@
             <a:fld id="{87DE6118-2437-4B30-8E3C-4D2BE6020583}" type="datetimeFigureOut">
               <a:rPr lang="en-US" dirty="0"/>
               <a:pPr/>
-              <a:t>5/6/22</a:t>
+              <a:t>5/7/22</a:t>
             </a:fld>
             <a:endParaRPr lang="en-US" dirty="0"/>
           </a:p>
@@ -3016,7 +3021,7 @@
             <a:fld id="{87DE6118-2437-4B30-8E3C-4D2BE6020583}" type="datetimeFigureOut">
               <a:rPr lang="en-US" dirty="0"/>
               <a:pPr/>
-              <a:t>5/6/22</a:t>
+              <a:t>5/7/22</a:t>
             </a:fld>
             <a:endParaRPr lang="en-US" dirty="0"/>
           </a:p>
@@ -3291,7 +3296,7 @@
             <a:fld id="{87DE6118-2437-4B30-8E3C-4D2BE6020583}" type="datetimeFigureOut">
               <a:rPr lang="en-US" dirty="0"/>
               <a:pPr/>
-              <a:t>5/6/22</a:t>
+              <a:t>5/7/22</a:t>
             </a:fld>
             <a:endParaRPr lang="en-US" dirty="0"/>
           </a:p>
@@ -4980,11 +4985,11 @@
             </a:r>
             <a:r>
               <a:rPr lang="en-US" sz="1300" i="0" dirty="0" err="1"/>
-              <a:t>Levenstein</a:t>
+              <a:t>Levenshtein</a:t>
             </a:r>
             <a:r>
               <a:rPr lang="en-US" sz="1300" i="0" dirty="0"/>
-              <a:t> distance</a:t>
+              <a:t>  distance</a:t>
             </a:r>
           </a:p>
           <a:p>
@@ -5175,7 +5180,7 @@
         </p:spPr>
         <p:txBody>
           <a:bodyPr>
-            <a:normAutofit/>
+            <a:normAutofit fontScale="92500" lnSpcReduction="10000"/>
           </a:bodyPr>
           <a:lstStyle/>
           <a:p>
@@ -5221,6 +5226,61 @@
               <a:rPr lang="en-US" sz="1500" dirty="0"/>
               <a:t> library</a:t>
             </a:r>
+          </a:p>
+          <a:p>
+            <a:r>
+              <a:rPr lang="en-US" sz="1500" i="0" dirty="0"/>
+              <a:t>Hyperparameters:</a:t>
+            </a:r>
+          </a:p>
+          <a:p>
+            <a:pPr lvl="1"/>
+            <a:r>
+              <a:rPr lang="en-US" sz="1500" i="0" dirty="0"/>
+              <a:t>Loss function: Binary Cross Entropy</a:t>
+            </a:r>
+          </a:p>
+          <a:p>
+            <a:pPr lvl="1"/>
+            <a:r>
+              <a:rPr lang="en-US" sz="1500" i="0" dirty="0"/>
+              <a:t>Optimizer: Adam Optimizer</a:t>
+            </a:r>
+          </a:p>
+          <a:p>
+            <a:pPr lvl="1"/>
+            <a:r>
+              <a:rPr lang="en-US" sz="1500" i="0" dirty="0"/>
+              <a:t>Filter size: 250</a:t>
+            </a:r>
+          </a:p>
+          <a:p>
+            <a:pPr lvl="1"/>
+            <a:r>
+              <a:rPr lang="en-US" sz="1500" i="0" dirty="0"/>
+              <a:t>Kernel size: 2, 3, 4</a:t>
+            </a:r>
+          </a:p>
+          <a:p>
+            <a:pPr lvl="1"/>
+            <a:r>
+              <a:rPr lang="en-US" sz="1500" i="0" dirty="0"/>
+              <a:t>Epochs: 25</a:t>
+            </a:r>
+          </a:p>
+          <a:p>
+            <a:pPr lvl="1"/>
+            <a:r>
+              <a:rPr lang="en-US" sz="1500" i="0" dirty="0"/>
+              <a:t>Batch size: 32</a:t>
+            </a:r>
+          </a:p>
+          <a:p>
+            <a:pPr lvl="1"/>
+            <a:endParaRPr lang="en-US" sz="1500" i="0" dirty="0"/>
+          </a:p>
+          <a:p>
+            <a:pPr lvl="1"/>
             <a:endParaRPr lang="en-US" sz="1500" i="0" dirty="0"/>
           </a:p>
         </p:txBody>
@@ -5902,10 +5962,9 @@
           <a:lstStyle/>
           <a:p>
             <a:r>
-              <a:rPr lang="en-US"/>
+              <a:rPr lang="en-US" dirty="0"/>
               <a:t>Trainable initial weight in the first layer of CNN models – better result as compared to fix initial weight</a:t>
             </a:r>
-            <a:endParaRPr lang="en-US" dirty="0"/>
           </a:p>
         </p:txBody>
       </p:sp>
@@ -6024,7 +6083,7 @@
             </a:r>
             <a:r>
               <a:rPr lang="en-US" dirty="0" err="1"/>
-              <a:t>Levenstein</a:t>
+              <a:t>Levenshtein</a:t>
             </a:r>
             <a:r>
               <a:rPr lang="en-US" dirty="0"/>
@@ -6034,7 +6093,7 @@
           <a:p>
             <a:r>
               <a:rPr lang="en-US" dirty="0"/>
-              <a:t>Training of models: Computation resource restriction on personal notepad and on Google </a:t>
+              <a:t>Training of models: Computation resource restriction on personal laptop and on Google </a:t>
             </a:r>
             <a:r>
               <a:rPr lang="en-US" dirty="0" err="1"/>

</xml_diff>